<commit_message>
Add slide with more ciphers
</commit_message>
<xml_diff>
--- a/Crypto-101.pptx
+++ b/Crypto-101.pptx
@@ -13,7 +13,8 @@
     <p:sldId id="261" r:id="rId7"/>
     <p:sldId id="262" r:id="rId8"/>
     <p:sldId id="263" r:id="rId9"/>
-    <p:sldId id="264" r:id="rId10"/>
+    <p:sldId id="265" r:id="rId10"/>
+    <p:sldId id="264" r:id="rId11"/>
   </p:sldIdLst>
   <p:sldSz cx="12192000" cy="6858000"/>
   <p:notesSz cx="6858000" cy="9144000"/>
@@ -3545,6 +3546,89 @@
 </p:sld>
 </file>
 
+<file path=ppt/slides/slide10.xml><?xml version="1.0" encoding="utf-8"?>
+<p:sld xmlns:a="http://schemas.openxmlformats.org/drawingml/2006/main" xmlns:r="http://schemas.openxmlformats.org/officeDocument/2006/relationships" xmlns:p="http://schemas.openxmlformats.org/presentationml/2006/main">
+  <p:cSld>
+    <p:spTree>
+      <p:nvGrpSpPr>
+        <p:cNvPr id="1" name=""/>
+        <p:cNvGrpSpPr/>
+        <p:nvPr/>
+      </p:nvGrpSpPr>
+      <p:grpSpPr>
+        <a:xfrm>
+          <a:off x="0" y="0"/>
+          <a:ext cx="0" cy="0"/>
+          <a:chOff x="0" y="0"/>
+          <a:chExt cx="0" cy="0"/>
+        </a:xfrm>
+      </p:grpSpPr>
+      <p:sp>
+        <p:nvSpPr>
+          <p:cNvPr id="2" name="Title 1"/>
+          <p:cNvSpPr>
+            <a:spLocks noGrp="1"/>
+          </p:cNvSpPr>
+          <p:nvPr>
+            <p:ph type="title"/>
+          </p:nvPr>
+        </p:nvSpPr>
+        <p:spPr/>
+        <p:txBody>
+          <a:bodyPr/>
+          <a:lstStyle/>
+          <a:p>
+            <a:r>
+              <a:rPr lang="en-US" dirty="0" smtClean="0"/>
+              <a:t>Challenge</a:t>
+            </a:r>
+            <a:endParaRPr lang="en-US" dirty="0"/>
+          </a:p>
+        </p:txBody>
+      </p:sp>
+      <p:sp>
+        <p:nvSpPr>
+          <p:cNvPr id="3" name="Content Placeholder 2"/>
+          <p:cNvSpPr>
+            <a:spLocks noGrp="1"/>
+          </p:cNvSpPr>
+          <p:nvPr>
+            <p:ph idx="1"/>
+          </p:nvPr>
+        </p:nvSpPr>
+        <p:spPr/>
+        <p:txBody>
+          <a:bodyPr/>
+          <a:lstStyle/>
+          <a:p>
+            <a:r>
+              <a:rPr lang="en-US" dirty="0"/>
+              <a:t>http://com1243.eecs.utk.edu:8888/</a:t>
+            </a:r>
+            <a:r>
+              <a:rPr lang="en-US" dirty="0" err="1"/>
+              <a:t>crypto_warmup</a:t>
+            </a:r>
+            <a:r>
+              <a:rPr lang="en-US" dirty="0"/>
+              <a:t>/</a:t>
+            </a:r>
+          </a:p>
+        </p:txBody>
+      </p:sp>
+    </p:spTree>
+    <p:extLst>
+      <p:ext uri="{BB962C8B-B14F-4D97-AF65-F5344CB8AC3E}">
+        <p14:creationId xmlns:p14="http://schemas.microsoft.com/office/powerpoint/2010/main" val="1469132048"/>
+      </p:ext>
+    </p:extLst>
+  </p:cSld>
+  <p:clrMapOvr>
+    <a:masterClrMapping/>
+  </p:clrMapOvr>
+</p:sld>
+</file>
+
 <file path=ppt/slides/slide2.xml><?xml version="1.0" encoding="utf-8"?>
 <p:sld xmlns:a="http://schemas.openxmlformats.org/drawingml/2006/main" xmlns:r="http://schemas.openxmlformats.org/officeDocument/2006/relationships" xmlns:p="http://schemas.openxmlformats.org/presentationml/2006/main">
   <p:cSld>
@@ -5882,7 +5966,7 @@
           <a:p>
             <a:r>
               <a:rPr lang="en-US" dirty="0" smtClean="0"/>
-              <a:t>Challenge</a:t>
+              <a:t>And More…</a:t>
             </a:r>
             <a:endParaRPr lang="en-US" dirty="0"/>
           </a:p>
@@ -5900,34 +5984,56 @@
         </p:nvSpPr>
         <p:spPr/>
         <p:txBody>
-          <a:bodyPr/>
+          <a:bodyPr>
+            <a:normAutofit/>
+          </a:bodyPr>
           <a:lstStyle/>
           <a:p>
             <a:r>
-              <a:rPr lang="en-US" dirty="0"/>
-              <a:t>http://com1243.eecs.utk.edu:8888/</a:t>
-            </a:r>
-            <a:r>
-              <a:rPr lang="en-US" dirty="0" err="1"/>
-              <a:t>crypto_warmup</a:t>
-            </a:r>
-            <a:r>
-              <a:rPr lang="en-US" dirty="0"/>
-              <a:t>/</a:t>
-            </a:r>
+              <a:rPr lang="en-US" sz="2800" dirty="0" smtClean="0"/>
+              <a:t>Transposition Ciphers</a:t>
+            </a:r>
+          </a:p>
+          <a:p>
+            <a:r>
+              <a:rPr lang="en-US" sz="2800" dirty="0" smtClean="0"/>
+              <a:t>Repeating key XOR</a:t>
+            </a:r>
+          </a:p>
+          <a:p>
+            <a:r>
+              <a:rPr lang="en-US" sz="2800" dirty="0" err="1"/>
+              <a:t>Playfair</a:t>
+            </a:r>
+            <a:r>
+              <a:rPr lang="en-US" sz="2800"/>
+              <a:t> </a:t>
+            </a:r>
+            <a:r>
+              <a:rPr lang="en-US" sz="2800" smtClean="0"/>
+              <a:t>cipher</a:t>
+            </a:r>
+            <a:endParaRPr lang="en-US" sz="2800"/>
           </a:p>
         </p:txBody>
       </p:sp>
     </p:spTree>
     <p:extLst>
       <p:ext uri="{BB962C8B-B14F-4D97-AF65-F5344CB8AC3E}">
-        <p14:creationId xmlns:p14="http://schemas.microsoft.com/office/powerpoint/2010/main" val="1469132048"/>
+        <p14:creationId xmlns:p14="http://schemas.microsoft.com/office/powerpoint/2010/main" val="832574752"/>
       </p:ext>
     </p:extLst>
   </p:cSld>
   <p:clrMapOvr>
     <a:masterClrMapping/>
   </p:clrMapOvr>
+  <p:timing>
+    <p:tnLst>
+      <p:par>
+        <p:cTn id="1" dur="indefinite" restart="never" nodeType="tmRoot"/>
+      </p:par>
+    </p:tnLst>
+  </p:timing>
 </p:sld>
 </file>
 

</xml_diff>

<commit_message>
Use link shortner for challenges
</commit_message>
<xml_diff>
--- a/Crypto-101.pptx
+++ b/Crypto-101.pptx
@@ -3631,7 +3631,7 @@
           <a:p>
             <a:r>
               <a:rPr lang="en-US" dirty="0" smtClean="0"/>
-              <a:t>Challenge</a:t>
+              <a:t>Challenges</a:t>
             </a:r>
             <a:endParaRPr lang="en-US" dirty="0"/>
           </a:p>
@@ -3655,41 +3655,37 @@
           <a:lstStyle/>
           <a:p>
             <a:r>
+              <a:rPr lang="en-US" sz="2400" dirty="0"/>
+              <a:t>Problems: </a:t>
+            </a:r>
+            <a:r>
+              <a:rPr lang="en-US" sz="2400" dirty="0">
+                <a:hlinkClick r:id="rId2"/>
+              </a:rPr>
+              <a:t>https://</a:t>
+            </a:r>
+            <a:r>
               <a:rPr lang="en-US" sz="2400" dirty="0" smtClean="0">
                 <a:hlinkClick r:id="rId2"/>
               </a:rPr>
-              <a:t>http</a:t>
-            </a:r>
-            <a:r>
-              <a:rPr lang="en-US" sz="2400" dirty="0">
-                <a:hlinkClick r:id="rId2"/>
-              </a:rPr>
-              <a:t>://com1243.eecs.utk.edu:8888/crypto_warmup</a:t>
-            </a:r>
-            <a:r>
-              <a:rPr lang="en-US" sz="2400" dirty="0" smtClean="0">
-                <a:hlinkClick r:id="rId2"/>
-              </a:rPr>
-              <a:t>/</a:t>
-            </a:r>
-            <a:endParaRPr lang="en-US" sz="2400" dirty="0" smtClean="0"/>
-          </a:p>
-          <a:p>
-            <a:r>
-              <a:rPr lang="en-US" sz="2400" dirty="0"/>
-              <a:t>Solutions: </a:t>
-            </a:r>
-            <a:r>
-              <a:rPr lang="en-US" sz="2400" dirty="0">
-                <a:hlinkClick r:id="rId3"/>
-              </a:rPr>
-              <a:t>https://</a:t>
+              <a:t>tiny.utk.edu/crypto-practice</a:t>
+            </a:r>
+            <a:endParaRPr lang="en-US" sz="2400" dirty="0"/>
+          </a:p>
+          <a:p>
+            <a:r>
+              <a:rPr lang="en-US" sz="2400" dirty="0" smtClean="0"/>
+              <a:t>Solutions</a:t>
+            </a:r>
+            <a:r>
+              <a:rPr lang="en-US" sz="2400" dirty="0" smtClean="0"/>
+              <a:t>: </a:t>
             </a:r>
             <a:r>
               <a:rPr lang="en-US" sz="2400" dirty="0" smtClean="0">
                 <a:hlinkClick r:id="rId3"/>
               </a:rPr>
-              <a:t>github.com/hackutk/historical-crypto</a:t>
+              <a:t>https://github.com/hackutk/historical-crypto</a:t>
             </a:r>
             <a:endParaRPr lang="en-US" sz="2400" dirty="0" smtClean="0"/>
           </a:p>

</xml_diff>